<commit_message>
BUGFIX:player name to play
</commit_message>
<xml_diff>
--- a/Présentation Projet Informatique.pptx
+++ b/Présentation Projet Informatique.pptx
@@ -209,7 +209,7 @@
           <a:p>
             <a:fld id="{FADC2AC3-33FB-41E4-9B23-DB8130FDF3B7}" type="datetimeFigureOut">
               <a:rPr lang="en-US" smtClean="0"/>
-              <a:t>1/15/2013</a:t>
+              <a:t>1/16/2013</a:t>
             </a:fld>
             <a:endParaRPr lang="en-US"/>
           </a:p>
@@ -785,9 +785,9 @@
             <a:extLst/>
           </a:lstStyle>
           <a:p>
-            <a:fld id="{BE9E0EBE-5F29-48B3-85E3-CBB71DFD58DB}" type="datetimeFigureOut">
+            <a:fld id="{D44EC3B0-8C7B-4538-8EDF-3133397215EE}" type="datetime1">
               <a:rPr lang="en-US" smtClean="0"/>
-              <a:t>1/15/2013</a:t>
+              <a:t>1/16/2013</a:t>
             </a:fld>
             <a:endParaRPr lang="en-US"/>
           </a:p>
@@ -1098,9 +1098,9 @@
             <a:extLst/>
           </a:lstStyle>
           <a:p>
-            <a:fld id="{BE9E0EBE-5F29-48B3-85E3-CBB71DFD58DB}" type="datetimeFigureOut">
+            <a:fld id="{A73F1DB9-8C47-4B72-A386-9896E406B89A}" type="datetime1">
               <a:rPr lang="en-US" smtClean="0"/>
-              <a:t>1/15/2013</a:t>
+              <a:t>1/16/2013</a:t>
             </a:fld>
             <a:endParaRPr lang="en-US"/>
           </a:p>
@@ -1283,9 +1283,9 @@
             <a:extLst/>
           </a:lstStyle>
           <a:p>
-            <a:fld id="{BE9E0EBE-5F29-48B3-85E3-CBB71DFD58DB}" type="datetimeFigureOut">
+            <a:fld id="{1C3D35AF-D575-4B20-9F07-66D3E16B2923}" type="datetime1">
               <a:rPr lang="en-US" smtClean="0"/>
-              <a:t>1/15/2013</a:t>
+              <a:t>1/16/2013</a:t>
             </a:fld>
             <a:endParaRPr lang="en-US"/>
           </a:p>
@@ -1458,9 +1458,9 @@
             <a:extLst/>
           </a:lstStyle>
           <a:p>
-            <a:fld id="{BE9E0EBE-5F29-48B3-85E3-CBB71DFD58DB}" type="datetimeFigureOut">
+            <a:fld id="{A39B2DF9-4494-442C-B34F-FD7738125AD8}" type="datetime1">
               <a:rPr lang="en-US" smtClean="0"/>
-              <a:t>1/15/2013</a:t>
+              <a:t>1/16/2013</a:t>
             </a:fld>
             <a:endParaRPr lang="en-US"/>
           </a:p>
@@ -1726,9 +1726,9 @@
             <a:extLst/>
           </a:lstStyle>
           <a:p>
-            <a:fld id="{BE9E0EBE-5F29-48B3-85E3-CBB71DFD58DB}" type="datetimeFigureOut">
+            <a:fld id="{D43481B1-FA66-466C-9338-20BB953EA858}" type="datetime1">
               <a:rPr lang="en-US" smtClean="0"/>
-              <a:t>1/15/2013</a:t>
+              <a:t>1/16/2013</a:t>
             </a:fld>
             <a:endParaRPr lang="en-US"/>
           </a:p>
@@ -2194,9 +2194,9 @@
             <a:extLst/>
           </a:lstStyle>
           <a:p>
-            <a:fld id="{BE9E0EBE-5F29-48B3-85E3-CBB71DFD58DB}" type="datetimeFigureOut">
+            <a:fld id="{144F3F1D-1751-4405-82D9-640431E9A4C9}" type="datetime1">
               <a:rPr lang="en-US" smtClean="0"/>
-              <a:t>1/15/2013</a:t>
+              <a:t>1/16/2013</a:t>
             </a:fld>
             <a:endParaRPr lang="en-US"/>
           </a:p>
@@ -2683,9 +2683,9 @@
             <a:extLst/>
           </a:lstStyle>
           <a:p>
-            <a:fld id="{BE9E0EBE-5F29-48B3-85E3-CBB71DFD58DB}" type="datetimeFigureOut">
+            <a:fld id="{744AA746-18DD-4A35-A767-9F4A42339696}" type="datetime1">
               <a:rPr lang="en-US" smtClean="0"/>
-              <a:t>1/15/2013</a:t>
+              <a:t>1/16/2013</a:t>
             </a:fld>
             <a:endParaRPr lang="en-US"/>
           </a:p>
@@ -2809,9 +2809,9 @@
             <a:extLst/>
           </a:lstStyle>
           <a:p>
-            <a:fld id="{BE9E0EBE-5F29-48B3-85E3-CBB71DFD58DB}" type="datetimeFigureOut">
+            <a:fld id="{32F2212A-43C7-4F57-B3AD-7CD21F57D9B2}" type="datetime1">
               <a:rPr lang="en-US" smtClean="0"/>
-              <a:t>1/15/2013</a:t>
+              <a:t>1/16/2013</a:t>
             </a:fld>
             <a:endParaRPr lang="en-US"/>
           </a:p>
@@ -2953,9 +2953,9 @@
             <a:extLst/>
           </a:lstStyle>
           <a:p>
-            <a:fld id="{BE9E0EBE-5F29-48B3-85E3-CBB71DFD58DB}" type="datetimeFigureOut">
+            <a:fld id="{9C0E210C-2C67-4045-A192-00B9650B8BE3}" type="datetime1">
               <a:rPr lang="en-US" smtClean="0"/>
-              <a:t>1/15/2013</a:t>
+              <a:t>1/16/2013</a:t>
             </a:fld>
             <a:endParaRPr lang="en-US"/>
           </a:p>
@@ -3275,9 +3275,9 @@
             <a:extLst/>
           </a:lstStyle>
           <a:p>
-            <a:fld id="{BE9E0EBE-5F29-48B3-85E3-CBB71DFD58DB}" type="datetimeFigureOut">
+            <a:fld id="{BCA98967-C7E6-41DB-A6E8-0F32BDFC98CA}" type="datetime1">
               <a:rPr lang="en-US" smtClean="0"/>
-              <a:t>1/15/2013</a:t>
+              <a:t>1/16/2013</a:t>
             </a:fld>
             <a:endParaRPr lang="en-US"/>
           </a:p>
@@ -3409,9 +3409,9 @@
             <a:extLst/>
           </a:lstStyle>
           <a:p>
-            <a:fld id="{BE9E0EBE-5F29-48B3-85E3-CBB71DFD58DB}" type="datetimeFigureOut">
+            <a:fld id="{C34421B5-A5B5-491E-A477-2EC943308C4B}" type="datetime1">
               <a:rPr lang="en-US" smtClean="0"/>
-              <a:t>1/15/2013</a:t>
+              <a:t>1/16/2013</a:t>
             </a:fld>
             <a:endParaRPr lang="en-US"/>
           </a:p>
@@ -4208,9 +4208,9 @@
             <a:extLst/>
           </a:lstStyle>
           <a:p>
-            <a:fld id="{BE9E0EBE-5F29-48B3-85E3-CBB71DFD58DB}" type="datetimeFigureOut">
+            <a:fld id="{C537F7C6-E3F3-471B-A0A0-F6F2F71D312F}" type="datetime1">
               <a:rPr lang="en-US" smtClean="0"/>
-              <a:t>1/15/2013</a:t>
+              <a:t>1/16/2013</a:t>
             </a:fld>
             <a:endParaRPr lang="en-US"/>
           </a:p>
@@ -4372,6 +4372,7 @@
     <p:sldLayoutId id="2147483826" r:id="rId10"/>
     <p:sldLayoutId id="2147483827" r:id="rId11"/>
   </p:sldLayoutIdLst>
+  <p:hf hdr="0" ftr="0" dt="0"/>
   <p:txStyles>
     <p:titleStyle>
       <a:lvl1pPr algn="l" rtl="0" eaLnBrk="1" latinLnBrk="0" hangingPunct="1">
@@ -4787,7 +4788,31 @@
                   <a:schemeClr val="tx1"/>
                 </a:solidFill>
               </a:rPr>
-              <a:t>Présentation Projet Informatique: LE BEARDMAN</a:t>
+              <a:t>Présentation Projet </a:t>
+            </a:r>
+            <a:r>
+              <a:rPr lang="fr-FR" smtClean="0">
+                <a:solidFill>
+                  <a:schemeClr val="tx1"/>
+                </a:solidFill>
+              </a:rPr>
+              <a:t>Informatique</a:t>
+            </a:r>
+            <a:r>
+              <a:rPr lang="fr-FR" smtClean="0">
+                <a:solidFill>
+                  <a:schemeClr val="tx1"/>
+                </a:solidFill>
+              </a:rPr>
+              <a:t>: </a:t>
+            </a:r>
+            <a:r>
+              <a:rPr lang="fr-FR" dirty="0" smtClean="0">
+                <a:solidFill>
+                  <a:schemeClr val="tx1"/>
+                </a:solidFill>
+              </a:rPr>
+              <a:t>BEARDMAN</a:t>
             </a:r>
             <a:endParaRPr lang="en-US" dirty="0">
               <a:solidFill>
@@ -4883,7 +4908,7 @@
         </p:nvSpPr>
         <p:spPr>
           <a:xfrm>
-            <a:off x="7772400" y="6553200"/>
+            <a:off x="7162800" y="6488668"/>
             <a:ext cx="1371600" cy="369332"/>
           </a:xfrm>
           <a:prstGeom prst="rect">
@@ -4902,6 +4927,29 @@
               <a:t>2012-2013</a:t>
             </a:r>
             <a:endParaRPr lang="en-US" dirty="0"/>
+          </a:p>
+        </p:txBody>
+      </p:sp>
+      <p:sp>
+        <p:nvSpPr>
+          <p:cNvPr id="3" name="Slide Number Placeholder 2"/>
+          <p:cNvSpPr>
+            <a:spLocks noGrp="1"/>
+          </p:cNvSpPr>
+          <p:nvPr>
+            <p:ph type="sldNum" sz="quarter" idx="12"/>
+          </p:nvPr>
+        </p:nvSpPr>
+        <p:spPr/>
+        <p:txBody>
+          <a:bodyPr/>
+          <a:lstStyle/>
+          <a:p>
+            <a:fld id="{37E93C4A-5839-43C5-A6F7-165607B489E3}" type="slidenum">
+              <a:rPr lang="en-US" smtClean="0"/>
+              <a:t>1</a:t>
+            </a:fld>
+            <a:endParaRPr lang="en-US"/>
           </a:p>
         </p:txBody>
       </p:sp>
@@ -5202,6 +5250,29 @@
           </a:extLst>
         </p:spPr>
       </p:pic>
+      <p:sp>
+        <p:nvSpPr>
+          <p:cNvPr id="2" name="Slide Number Placeholder 1"/>
+          <p:cNvSpPr>
+            <a:spLocks noGrp="1"/>
+          </p:cNvSpPr>
+          <p:nvPr>
+            <p:ph type="sldNum" sz="quarter" idx="12"/>
+          </p:nvPr>
+        </p:nvSpPr>
+        <p:spPr/>
+        <p:txBody>
+          <a:bodyPr/>
+          <a:lstStyle/>
+          <a:p>
+            <a:fld id="{37E93C4A-5839-43C5-A6F7-165607B489E3}" type="slidenum">
+              <a:rPr lang="en-US" smtClean="0"/>
+              <a:t>10</a:t>
+            </a:fld>
+            <a:endParaRPr lang="en-US"/>
+          </a:p>
+        </p:txBody>
+      </p:sp>
     </p:spTree>
     <p:extLst>
       <p:ext uri="{BB962C8B-B14F-4D97-AF65-F5344CB8AC3E}">
@@ -5403,6 +5474,29 @@
           </a:extLst>
         </p:spPr>
       </p:pic>
+      <p:sp>
+        <p:nvSpPr>
+          <p:cNvPr id="4" name="Slide Number Placeholder 3"/>
+          <p:cNvSpPr>
+            <a:spLocks noGrp="1"/>
+          </p:cNvSpPr>
+          <p:nvPr>
+            <p:ph type="sldNum" sz="quarter" idx="12"/>
+          </p:nvPr>
+        </p:nvSpPr>
+        <p:spPr/>
+        <p:txBody>
+          <a:bodyPr/>
+          <a:lstStyle/>
+          <a:p>
+            <a:fld id="{37E93C4A-5839-43C5-A6F7-165607B489E3}" type="slidenum">
+              <a:rPr lang="en-US" smtClean="0"/>
+              <a:t>11</a:t>
+            </a:fld>
+            <a:endParaRPr lang="en-US"/>
+          </a:p>
+        </p:txBody>
+      </p:sp>
     </p:spTree>
     <p:extLst>
       <p:ext uri="{BB962C8B-B14F-4D97-AF65-F5344CB8AC3E}">
@@ -5760,6 +5854,29 @@
           </a:p>
         </p:txBody>
       </p:sp>
+      <p:sp>
+        <p:nvSpPr>
+          <p:cNvPr id="4" name="Slide Number Placeholder 3"/>
+          <p:cNvSpPr>
+            <a:spLocks noGrp="1"/>
+          </p:cNvSpPr>
+          <p:nvPr>
+            <p:ph type="sldNum" sz="quarter" idx="12"/>
+          </p:nvPr>
+        </p:nvSpPr>
+        <p:spPr/>
+        <p:txBody>
+          <a:bodyPr/>
+          <a:lstStyle/>
+          <a:p>
+            <a:fld id="{37E93C4A-5839-43C5-A6F7-165607B489E3}" type="slidenum">
+              <a:rPr lang="en-US" smtClean="0"/>
+              <a:t>12</a:t>
+            </a:fld>
+            <a:endParaRPr lang="en-US"/>
+          </a:p>
+        </p:txBody>
+      </p:sp>
     </p:spTree>
     <p:extLst>
       <p:ext uri="{BB962C8B-B14F-4D97-AF65-F5344CB8AC3E}">
@@ -6041,6 +6158,29 @@
           </a:p>
         </p:txBody>
       </p:sp>
+      <p:sp>
+        <p:nvSpPr>
+          <p:cNvPr id="4" name="Slide Number Placeholder 3"/>
+          <p:cNvSpPr>
+            <a:spLocks noGrp="1"/>
+          </p:cNvSpPr>
+          <p:nvPr>
+            <p:ph type="sldNum" sz="quarter" idx="12"/>
+          </p:nvPr>
+        </p:nvSpPr>
+        <p:spPr/>
+        <p:txBody>
+          <a:bodyPr/>
+          <a:lstStyle/>
+          <a:p>
+            <a:fld id="{37E93C4A-5839-43C5-A6F7-165607B489E3}" type="slidenum">
+              <a:rPr lang="en-US" smtClean="0"/>
+              <a:t>13</a:t>
+            </a:fld>
+            <a:endParaRPr lang="en-US"/>
+          </a:p>
+        </p:txBody>
+      </p:sp>
     </p:spTree>
     <p:extLst>
       <p:ext uri="{BB962C8B-B14F-4D97-AF65-F5344CB8AC3E}">
@@ -6415,6 +6555,29 @@
           </a:p>
         </p:txBody>
       </p:sp>
+      <p:sp>
+        <p:nvSpPr>
+          <p:cNvPr id="4" name="Slide Number Placeholder 3"/>
+          <p:cNvSpPr>
+            <a:spLocks noGrp="1"/>
+          </p:cNvSpPr>
+          <p:nvPr>
+            <p:ph type="sldNum" sz="quarter" idx="12"/>
+          </p:nvPr>
+        </p:nvSpPr>
+        <p:spPr/>
+        <p:txBody>
+          <a:bodyPr/>
+          <a:lstStyle/>
+          <a:p>
+            <a:fld id="{37E93C4A-5839-43C5-A6F7-165607B489E3}" type="slidenum">
+              <a:rPr lang="en-US" smtClean="0"/>
+              <a:t>14</a:t>
+            </a:fld>
+            <a:endParaRPr lang="en-US"/>
+          </a:p>
+        </p:txBody>
+      </p:sp>
     </p:spTree>
     <p:extLst>
       <p:ext uri="{BB962C8B-B14F-4D97-AF65-F5344CB8AC3E}">
@@ -6811,6 +6974,29 @@
           </a:p>
           <a:p>
             <a:endParaRPr lang="fr-FR" dirty="0"/>
+          </a:p>
+        </p:txBody>
+      </p:sp>
+      <p:sp>
+        <p:nvSpPr>
+          <p:cNvPr id="4" name="Slide Number Placeholder 3"/>
+          <p:cNvSpPr>
+            <a:spLocks noGrp="1"/>
+          </p:cNvSpPr>
+          <p:nvPr>
+            <p:ph type="sldNum" sz="quarter" idx="12"/>
+          </p:nvPr>
+        </p:nvSpPr>
+        <p:spPr/>
+        <p:txBody>
+          <a:bodyPr/>
+          <a:lstStyle/>
+          <a:p>
+            <a:fld id="{37E93C4A-5839-43C5-A6F7-165607B489E3}" type="slidenum">
+              <a:rPr lang="en-US" smtClean="0"/>
+              <a:t>15</a:t>
+            </a:fld>
+            <a:endParaRPr lang="en-US"/>
           </a:p>
         </p:txBody>
       </p:sp>
@@ -7002,6 +7188,29 @@
           </a:extLst>
         </p:spPr>
       </p:pic>
+      <p:sp>
+        <p:nvSpPr>
+          <p:cNvPr id="4" name="Slide Number Placeholder 3"/>
+          <p:cNvSpPr>
+            <a:spLocks noGrp="1"/>
+          </p:cNvSpPr>
+          <p:nvPr>
+            <p:ph type="sldNum" sz="quarter" idx="12"/>
+          </p:nvPr>
+        </p:nvSpPr>
+        <p:spPr/>
+        <p:txBody>
+          <a:bodyPr/>
+          <a:lstStyle/>
+          <a:p>
+            <a:fld id="{37E93C4A-5839-43C5-A6F7-165607B489E3}" type="slidenum">
+              <a:rPr lang="en-US" smtClean="0"/>
+              <a:t>16</a:t>
+            </a:fld>
+            <a:endParaRPr lang="en-US"/>
+          </a:p>
+        </p:txBody>
+      </p:sp>
     </p:spTree>
     <p:extLst>
       <p:ext uri="{BB962C8B-B14F-4D97-AF65-F5344CB8AC3E}">
@@ -7101,6 +7310,29 @@
           </a:p>
         </p:txBody>
       </p:sp>
+      <p:sp>
+        <p:nvSpPr>
+          <p:cNvPr id="3" name="Slide Number Placeholder 2"/>
+          <p:cNvSpPr>
+            <a:spLocks noGrp="1"/>
+          </p:cNvSpPr>
+          <p:nvPr>
+            <p:ph type="sldNum" sz="quarter" idx="12"/>
+          </p:nvPr>
+        </p:nvSpPr>
+        <p:spPr/>
+        <p:txBody>
+          <a:bodyPr/>
+          <a:lstStyle/>
+          <a:p>
+            <a:fld id="{37E93C4A-5839-43C5-A6F7-165607B489E3}" type="slidenum">
+              <a:rPr lang="en-US" smtClean="0"/>
+              <a:t>17</a:t>
+            </a:fld>
+            <a:endParaRPr lang="en-US"/>
+          </a:p>
+        </p:txBody>
+      </p:sp>
     </p:spTree>
     <p:extLst>
       <p:ext uri="{BB962C8B-B14F-4D97-AF65-F5344CB8AC3E}">
@@ -7217,6 +7449,29 @@
           </a:p>
         </p:txBody>
       </p:sp>
+      <p:sp>
+        <p:nvSpPr>
+          <p:cNvPr id="3" name="Slide Number Placeholder 2"/>
+          <p:cNvSpPr>
+            <a:spLocks noGrp="1"/>
+          </p:cNvSpPr>
+          <p:nvPr>
+            <p:ph type="sldNum" sz="quarter" idx="12"/>
+          </p:nvPr>
+        </p:nvSpPr>
+        <p:spPr/>
+        <p:txBody>
+          <a:bodyPr/>
+          <a:lstStyle/>
+          <a:p>
+            <a:fld id="{37E93C4A-5839-43C5-A6F7-165607B489E3}" type="slidenum">
+              <a:rPr lang="en-US" smtClean="0"/>
+              <a:t>18</a:t>
+            </a:fld>
+            <a:endParaRPr lang="en-US"/>
+          </a:p>
+        </p:txBody>
+      </p:sp>
     </p:spTree>
     <p:extLst>
       <p:ext uri="{BB962C8B-B14F-4D97-AF65-F5344CB8AC3E}">
@@ -7446,6 +7701,29 @@
           </a:p>
           <a:p>
             <a:endParaRPr lang="en-US" sz="2000" dirty="0"/>
+          </a:p>
+        </p:txBody>
+      </p:sp>
+      <p:sp>
+        <p:nvSpPr>
+          <p:cNvPr id="2" name="Slide Number Placeholder 1"/>
+          <p:cNvSpPr>
+            <a:spLocks noGrp="1"/>
+          </p:cNvSpPr>
+          <p:nvPr>
+            <p:ph type="sldNum" sz="quarter" idx="12"/>
+          </p:nvPr>
+        </p:nvSpPr>
+        <p:spPr/>
+        <p:txBody>
+          <a:bodyPr/>
+          <a:lstStyle/>
+          <a:p>
+            <a:fld id="{37E93C4A-5839-43C5-A6F7-165607B489E3}" type="slidenum">
+              <a:rPr lang="en-US" smtClean="0"/>
+              <a:t>2</a:t>
+            </a:fld>
+            <a:endParaRPr lang="en-US"/>
           </a:p>
         </p:txBody>
       </p:sp>
@@ -7919,6 +8197,29 @@
           </a:extLst>
         </p:spPr>
       </p:pic>
+      <p:sp>
+        <p:nvSpPr>
+          <p:cNvPr id="2" name="Slide Number Placeholder 1"/>
+          <p:cNvSpPr>
+            <a:spLocks noGrp="1"/>
+          </p:cNvSpPr>
+          <p:nvPr>
+            <p:ph type="sldNum" sz="quarter" idx="12"/>
+          </p:nvPr>
+        </p:nvSpPr>
+        <p:spPr/>
+        <p:txBody>
+          <a:bodyPr/>
+          <a:lstStyle/>
+          <a:p>
+            <a:fld id="{37E93C4A-5839-43C5-A6F7-165607B489E3}" type="slidenum">
+              <a:rPr lang="en-US" smtClean="0"/>
+              <a:t>3</a:t>
+            </a:fld>
+            <a:endParaRPr lang="en-US"/>
+          </a:p>
+        </p:txBody>
+      </p:sp>
     </p:spTree>
     <p:extLst>
       <p:ext uri="{BB962C8B-B14F-4D97-AF65-F5344CB8AC3E}">
@@ -8121,6 +8422,29 @@
           </a:extLst>
         </p:spPr>
       </p:pic>
+      <p:sp>
+        <p:nvSpPr>
+          <p:cNvPr id="2" name="Slide Number Placeholder 1"/>
+          <p:cNvSpPr>
+            <a:spLocks noGrp="1"/>
+          </p:cNvSpPr>
+          <p:nvPr>
+            <p:ph type="sldNum" sz="quarter" idx="12"/>
+          </p:nvPr>
+        </p:nvSpPr>
+        <p:spPr/>
+        <p:txBody>
+          <a:bodyPr/>
+          <a:lstStyle/>
+          <a:p>
+            <a:fld id="{37E93C4A-5839-43C5-A6F7-165607B489E3}" type="slidenum">
+              <a:rPr lang="en-US" smtClean="0"/>
+              <a:t>4</a:t>
+            </a:fld>
+            <a:endParaRPr lang="en-US"/>
+          </a:p>
+        </p:txBody>
+      </p:sp>
     </p:spTree>
     <p:extLst>
       <p:ext uri="{BB962C8B-B14F-4D97-AF65-F5344CB8AC3E}">
@@ -8331,6 +8655,29 @@
           </a:extLst>
         </p:spPr>
       </p:pic>
+      <p:sp>
+        <p:nvSpPr>
+          <p:cNvPr id="2" name="Slide Number Placeholder 1"/>
+          <p:cNvSpPr>
+            <a:spLocks noGrp="1"/>
+          </p:cNvSpPr>
+          <p:nvPr>
+            <p:ph type="sldNum" sz="quarter" idx="12"/>
+          </p:nvPr>
+        </p:nvSpPr>
+        <p:spPr/>
+        <p:txBody>
+          <a:bodyPr/>
+          <a:lstStyle/>
+          <a:p>
+            <a:fld id="{37E93C4A-5839-43C5-A6F7-165607B489E3}" type="slidenum">
+              <a:rPr lang="en-US" smtClean="0"/>
+              <a:t>5</a:t>
+            </a:fld>
+            <a:endParaRPr lang="en-US"/>
+          </a:p>
+        </p:txBody>
+      </p:sp>
     </p:spTree>
     <p:extLst>
       <p:ext uri="{BB962C8B-B14F-4D97-AF65-F5344CB8AC3E}">
@@ -8537,6 +8884,29 @@
           </a:extLst>
         </p:spPr>
       </p:pic>
+      <p:sp>
+        <p:nvSpPr>
+          <p:cNvPr id="2" name="Slide Number Placeholder 1"/>
+          <p:cNvSpPr>
+            <a:spLocks noGrp="1"/>
+          </p:cNvSpPr>
+          <p:nvPr>
+            <p:ph type="sldNum" sz="quarter" idx="12"/>
+          </p:nvPr>
+        </p:nvSpPr>
+        <p:spPr/>
+        <p:txBody>
+          <a:bodyPr/>
+          <a:lstStyle/>
+          <a:p>
+            <a:fld id="{37E93C4A-5839-43C5-A6F7-165607B489E3}" type="slidenum">
+              <a:rPr lang="en-US" smtClean="0"/>
+              <a:t>6</a:t>
+            </a:fld>
+            <a:endParaRPr lang="en-US"/>
+          </a:p>
+        </p:txBody>
+      </p:sp>
     </p:spTree>
     <p:extLst>
       <p:ext uri="{BB962C8B-B14F-4D97-AF65-F5344CB8AC3E}">
@@ -8769,6 +9139,29 @@
           </a:p>
         </p:txBody>
       </p:sp>
+      <p:sp>
+        <p:nvSpPr>
+          <p:cNvPr id="2" name="Slide Number Placeholder 1"/>
+          <p:cNvSpPr>
+            <a:spLocks noGrp="1"/>
+          </p:cNvSpPr>
+          <p:nvPr>
+            <p:ph type="sldNum" sz="quarter" idx="12"/>
+          </p:nvPr>
+        </p:nvSpPr>
+        <p:spPr/>
+        <p:txBody>
+          <a:bodyPr/>
+          <a:lstStyle/>
+          <a:p>
+            <a:fld id="{37E93C4A-5839-43C5-A6F7-165607B489E3}" type="slidenum">
+              <a:rPr lang="en-US" smtClean="0"/>
+              <a:t>7</a:t>
+            </a:fld>
+            <a:endParaRPr lang="en-US"/>
+          </a:p>
+        </p:txBody>
+      </p:sp>
     </p:spTree>
     <p:extLst>
       <p:ext uri="{BB962C8B-B14F-4D97-AF65-F5344CB8AC3E}">
@@ -9001,6 +9394,29 @@
           </a:p>
         </p:txBody>
       </p:sp>
+      <p:sp>
+        <p:nvSpPr>
+          <p:cNvPr id="2" name="Slide Number Placeholder 1"/>
+          <p:cNvSpPr>
+            <a:spLocks noGrp="1"/>
+          </p:cNvSpPr>
+          <p:nvPr>
+            <p:ph type="sldNum" sz="quarter" idx="12"/>
+          </p:nvPr>
+        </p:nvSpPr>
+        <p:spPr/>
+        <p:txBody>
+          <a:bodyPr/>
+          <a:lstStyle/>
+          <a:p>
+            <a:fld id="{37E93C4A-5839-43C5-A6F7-165607B489E3}" type="slidenum">
+              <a:rPr lang="en-US" smtClean="0"/>
+              <a:t>8</a:t>
+            </a:fld>
+            <a:endParaRPr lang="en-US"/>
+          </a:p>
+        </p:txBody>
+      </p:sp>
     </p:spTree>
     <p:extLst>
       <p:ext uri="{BB962C8B-B14F-4D97-AF65-F5344CB8AC3E}">
@@ -9531,6 +9947,29 @@
           </a:extLst>
         </p:spPr>
       </p:pic>
+      <p:sp>
+        <p:nvSpPr>
+          <p:cNvPr id="4" name="Slide Number Placeholder 3"/>
+          <p:cNvSpPr>
+            <a:spLocks noGrp="1"/>
+          </p:cNvSpPr>
+          <p:nvPr>
+            <p:ph type="sldNum" sz="quarter" idx="12"/>
+          </p:nvPr>
+        </p:nvSpPr>
+        <p:spPr/>
+        <p:txBody>
+          <a:bodyPr/>
+          <a:lstStyle/>
+          <a:p>
+            <a:fld id="{37E93C4A-5839-43C5-A6F7-165607B489E3}" type="slidenum">
+              <a:rPr lang="en-US" smtClean="0"/>
+              <a:t>9</a:t>
+            </a:fld>
+            <a:endParaRPr lang="en-US"/>
+          </a:p>
+        </p:txBody>
+      </p:sp>
     </p:spTree>
     <p:extLst>
       <p:ext uri="{BB962C8B-B14F-4D97-AF65-F5344CB8AC3E}">

</xml_diff>